<commit_message>
updates to illusory tilt
- added non-illusory tilt condition
- added subplots to torsion data plots
- updated tiff image for 2AFC
- updated explanatory ppt for 2AFC
</commit_message>
<xml_diff>
--- a/+ArumeExperimentDesigns/@IllusoryTiltPerception/IllusoryTiltPerceptionInstructions.pptx
+++ b/+ArumeExperimentDesigns/@IllusoryTiltPerception/IllusoryTiltPerceptionInstructions.pptx
@@ -2,16 +2,16 @@
 <file path=ppt/presentation.xml><?xml version="1.0" encoding="utf-8"?>
 <p:presentation xmlns:a="http://schemas.openxmlformats.org/drawingml/2006/main" xmlns:r="http://schemas.openxmlformats.org/officeDocument/2006/relationships" xmlns:p="http://schemas.openxmlformats.org/presentationml/2006/main" saveSubsetFonts="1">
   <p:sldMasterIdLst>
-    <p:sldMasterId id="2147483648" r:id="rId1"/>
+    <p:sldMasterId id="2147483648" r:id="rId4"/>
   </p:sldMasterIdLst>
   <p:sldIdLst>
-    <p:sldId id="256" r:id="rId2"/>
-    <p:sldId id="257" r:id="rId3"/>
-    <p:sldId id="258" r:id="rId4"/>
-    <p:sldId id="259" r:id="rId5"/>
-    <p:sldId id="260" r:id="rId6"/>
-    <p:sldId id="261" r:id="rId7"/>
-    <p:sldId id="262" r:id="rId8"/>
+    <p:sldId id="256" r:id="rId5"/>
+    <p:sldId id="257" r:id="rId6"/>
+    <p:sldId id="258" r:id="rId7"/>
+    <p:sldId id="259" r:id="rId8"/>
+    <p:sldId id="260" r:id="rId9"/>
+    <p:sldId id="261" r:id="rId10"/>
+    <p:sldId id="262" r:id="rId11"/>
   </p:sldIdLst>
   <p:sldSz cx="12192000" cy="6858000"/>
   <p:notesSz cx="6858000" cy="9144000"/>
@@ -276,7 +276,7 @@
           <a:p>
             <a:fld id="{650DDBA5-6778-4113-AD0E-ABBAF35DD024}" type="datetimeFigureOut">
               <a:rPr lang="en-US" smtClean="0"/>
-              <a:t>4/29/2021</a:t>
+              <a:t>5/4/2021</a:t>
             </a:fld>
             <a:endParaRPr lang="en-US"/>
           </a:p>
@@ -474,7 +474,7 @@
           <a:p>
             <a:fld id="{650DDBA5-6778-4113-AD0E-ABBAF35DD024}" type="datetimeFigureOut">
               <a:rPr lang="en-US" smtClean="0"/>
-              <a:t>4/29/2021</a:t>
+              <a:t>5/4/2021</a:t>
             </a:fld>
             <a:endParaRPr lang="en-US"/>
           </a:p>
@@ -682,7 +682,7 @@
           <a:p>
             <a:fld id="{650DDBA5-6778-4113-AD0E-ABBAF35DD024}" type="datetimeFigureOut">
               <a:rPr lang="en-US" smtClean="0"/>
-              <a:t>4/29/2021</a:t>
+              <a:t>5/4/2021</a:t>
             </a:fld>
             <a:endParaRPr lang="en-US"/>
           </a:p>
@@ -880,7 +880,7 @@
           <a:p>
             <a:fld id="{650DDBA5-6778-4113-AD0E-ABBAF35DD024}" type="datetimeFigureOut">
               <a:rPr lang="en-US" smtClean="0"/>
-              <a:t>4/29/2021</a:t>
+              <a:t>5/4/2021</a:t>
             </a:fld>
             <a:endParaRPr lang="en-US"/>
           </a:p>
@@ -1155,7 +1155,7 @@
           <a:p>
             <a:fld id="{650DDBA5-6778-4113-AD0E-ABBAF35DD024}" type="datetimeFigureOut">
               <a:rPr lang="en-US" smtClean="0"/>
-              <a:t>4/29/2021</a:t>
+              <a:t>5/4/2021</a:t>
             </a:fld>
             <a:endParaRPr lang="en-US"/>
           </a:p>
@@ -1420,7 +1420,7 @@
           <a:p>
             <a:fld id="{650DDBA5-6778-4113-AD0E-ABBAF35DD024}" type="datetimeFigureOut">
               <a:rPr lang="en-US" smtClean="0"/>
-              <a:t>4/29/2021</a:t>
+              <a:t>5/4/2021</a:t>
             </a:fld>
             <a:endParaRPr lang="en-US"/>
           </a:p>
@@ -1832,7 +1832,7 @@
           <a:p>
             <a:fld id="{650DDBA5-6778-4113-AD0E-ABBAF35DD024}" type="datetimeFigureOut">
               <a:rPr lang="en-US" smtClean="0"/>
-              <a:t>4/29/2021</a:t>
+              <a:t>5/4/2021</a:t>
             </a:fld>
             <a:endParaRPr lang="en-US"/>
           </a:p>
@@ -1973,7 +1973,7 @@
           <a:p>
             <a:fld id="{650DDBA5-6778-4113-AD0E-ABBAF35DD024}" type="datetimeFigureOut">
               <a:rPr lang="en-US" smtClean="0"/>
-              <a:t>4/29/2021</a:t>
+              <a:t>5/4/2021</a:t>
             </a:fld>
             <a:endParaRPr lang="en-US"/>
           </a:p>
@@ -2086,7 +2086,7 @@
           <a:p>
             <a:fld id="{650DDBA5-6778-4113-AD0E-ABBAF35DD024}" type="datetimeFigureOut">
               <a:rPr lang="en-US" smtClean="0"/>
-              <a:t>4/29/2021</a:t>
+              <a:t>5/4/2021</a:t>
             </a:fld>
             <a:endParaRPr lang="en-US"/>
           </a:p>
@@ -2397,7 +2397,7 @@
           <a:p>
             <a:fld id="{650DDBA5-6778-4113-AD0E-ABBAF35DD024}" type="datetimeFigureOut">
               <a:rPr lang="en-US" smtClean="0"/>
-              <a:t>4/29/2021</a:t>
+              <a:t>5/4/2021</a:t>
             </a:fld>
             <a:endParaRPr lang="en-US"/>
           </a:p>
@@ -2685,7 +2685,7 @@
           <a:p>
             <a:fld id="{650DDBA5-6778-4113-AD0E-ABBAF35DD024}" type="datetimeFigureOut">
               <a:rPr lang="en-US" smtClean="0"/>
-              <a:t>4/29/2021</a:t>
+              <a:t>5/4/2021</a:t>
             </a:fld>
             <a:endParaRPr lang="en-US"/>
           </a:p>
@@ -2762,9 +2762,12 @@
 <p:sldMaster xmlns:a="http://schemas.openxmlformats.org/drawingml/2006/main" xmlns:r="http://schemas.openxmlformats.org/officeDocument/2006/relationships" xmlns:p="http://schemas.openxmlformats.org/presentationml/2006/main">
   <p:cSld>
     <p:bg>
-      <p:bgRef idx="1001">
-        <a:schemeClr val="bg1"/>
-      </p:bgRef>
+      <p:bgPr>
+        <a:solidFill>
+          <a:schemeClr val="tx1"/>
+        </a:solidFill>
+        <a:effectLst/>
+      </p:bgPr>
     </p:bg>
     <p:spTree>
       <p:nvGrpSpPr>
@@ -2926,7 +2929,7 @@
           <a:p>
             <a:fld id="{650DDBA5-6778-4113-AD0E-ABBAF35DD024}" type="datetimeFigureOut">
               <a:rPr lang="en-US" smtClean="0"/>
-              <a:t>4/29/2021</a:t>
+              <a:t>5/4/2021</a:t>
             </a:fld>
             <a:endParaRPr lang="en-US"/>
           </a:p>
@@ -5448,7 +5451,7 @@
           </a:stretch>
         </p:blipFill>
         <p:spPr>
-          <a:xfrm>
+          <a:xfrm rot="-180000">
             <a:off x="0" y="0"/>
             <a:ext cx="12192000" cy="6858000"/>
           </a:xfrm>
@@ -5564,7 +5567,7 @@
           </a:stretch>
         </p:blipFill>
         <p:spPr>
-          <a:xfrm flipH="1">
+          <a:xfrm rot="180000" flipH="1">
             <a:off x="0" y="0"/>
             <a:ext cx="12192000" cy="6858000"/>
           </a:xfrm>
@@ -6114,13 +6117,37 @@
 </file>
 
 <file path=customXml/itemProps1.xml><?xml version="1.0" encoding="utf-8"?>
-<ds:datastoreItem xmlns:ds="http://schemas.openxmlformats.org/officeDocument/2006/customXml" ds:itemID="{94007B62-B960-42FE-9C3A-2DDC475714CA}"/>
+<ds:datastoreItem xmlns:ds="http://schemas.openxmlformats.org/officeDocument/2006/customXml" ds:itemID="{94007B62-B960-42FE-9C3A-2DDC475714CA}">
+  <ds:schemaRefs>
+    <ds:schemaRef ds:uri="http://schemas.microsoft.com/office/2006/metadata/contentType"/>
+    <ds:schemaRef ds:uri="http://schemas.microsoft.com/office/2006/metadata/properties/metaAttributes"/>
+    <ds:schemaRef ds:uri="http://www.w3.org/2001/XMLSchema"/>
+    <ds:schemaRef ds:uri="http://schemas.microsoft.com/office/2006/metadata/properties"/>
+    <ds:schemaRef ds:uri="dab830d7-07ee-458a-b886-32578b44a612"/>
+    <ds:schemaRef ds:uri="a048c95d-56bc-4d9d-b7f4-f756d5a4a43b"/>
+    <ds:schemaRef ds:uri="http://schemas.microsoft.com/office/2006/documentManagement/types"/>
+    <ds:schemaRef ds:uri="http://schemas.microsoft.com/office/infopath/2007/PartnerControls"/>
+    <ds:schemaRef ds:uri="http://schemas.openxmlformats.org/package/2006/metadata/core-properties"/>
+    <ds:schemaRef ds:uri="http://purl.org/dc/elements/1.1/"/>
+    <ds:schemaRef ds:uri="http://purl.org/dc/terms/"/>
+    <ds:schemaRef ds:uri="http://schemas.microsoft.com/internal/obd"/>
+  </ds:schemaRefs>
+</ds:datastoreItem>
 </file>
 
 <file path=customXml/itemProps2.xml><?xml version="1.0" encoding="utf-8"?>
-<ds:datastoreItem xmlns:ds="http://schemas.openxmlformats.org/officeDocument/2006/customXml" ds:itemID="{A0AE1B13-F53E-4706-A28A-D71009DE1C25}"/>
+<ds:datastoreItem xmlns:ds="http://schemas.openxmlformats.org/officeDocument/2006/customXml" ds:itemID="{A0AE1B13-F53E-4706-A28A-D71009DE1C25}">
+  <ds:schemaRefs>
+    <ds:schemaRef ds:uri="http://schemas.microsoft.com/sharepoint/v3/contenttype/forms"/>
+  </ds:schemaRefs>
+</ds:datastoreItem>
 </file>
 
 <file path=customXml/itemProps3.xml><?xml version="1.0" encoding="utf-8"?>
-<ds:datastoreItem xmlns:ds="http://schemas.openxmlformats.org/officeDocument/2006/customXml" ds:itemID="{82EF4882-3A64-406D-B349-6502A269577D}"/>
+<ds:datastoreItem xmlns:ds="http://schemas.openxmlformats.org/officeDocument/2006/customXml" ds:itemID="{82EF4882-3A64-406D-B349-6502A269577D}">
+  <ds:schemaRefs>
+    <ds:schemaRef ds:uri="http://schemas.microsoft.com/office/2006/metadata/properties"/>
+    <ds:schemaRef ds:uri="http://schemas.microsoft.com/office/infopath/2007/PartnerControls"/>
+  </ds:schemaRefs>
+</ds:datastoreItem>
 </file>
</xml_diff>

<commit_message>
started to add eyelink
</commit_message>
<xml_diff>
--- a/+ArumeExperimentDesigns/@IllusoryTiltPerception/IllusoryTiltPerceptionInstructions.pptx
+++ b/+ArumeExperimentDesigns/@IllusoryTiltPerception/IllusoryTiltPerceptionInstructions.pptx
@@ -5885,8 +5885,8 @@
 </file>
 
 <file path=customXml/item1.xml><?xml version="1.0" encoding="utf-8"?>
-<ct:contentTypeSchema xmlns:ct="http://schemas.microsoft.com/office/2006/metadata/contentType" xmlns:ma="http://schemas.microsoft.com/office/2006/metadata/properties/metaAttributes" ct:_="" ma:_="" ma:contentTypeName="Document" ma:contentTypeID="0x010100CDA8567EE2FE4F4CBE3E2CEF37728AB4" ma:contentTypeVersion="13" ma:contentTypeDescription="Create a new document." ma:contentTypeScope="" ma:versionID="944aec89eaeaf5cf1995eca05db96066">
-  <xsd:schema xmlns:xsd="http://www.w3.org/2001/XMLSchema" xmlns:xs="http://www.w3.org/2001/XMLSchema" xmlns:p="http://schemas.microsoft.com/office/2006/metadata/properties" xmlns:ns2="dab830d7-07ee-458a-b886-32578b44a612" xmlns:ns3="a048c95d-56bc-4d9d-b7f4-f756d5a4a43b" targetNamespace="http://schemas.microsoft.com/office/2006/metadata/properties" ma:root="true" ma:fieldsID="36481b348f0f2de413f74f8a666e162d" ns2:_="" ns3:_="">
+<ct:contentTypeSchema xmlns:ct="http://schemas.microsoft.com/office/2006/metadata/contentType" xmlns:ma="http://schemas.microsoft.com/office/2006/metadata/properties/metaAttributes" ct:_="" ma:_="" ma:contentTypeName="Document" ma:contentTypeID="0x010100CDA8567EE2FE4F4CBE3E2CEF37728AB4" ma:contentTypeVersion="17" ma:contentTypeDescription="Create a new document." ma:contentTypeScope="" ma:versionID="f554a51c09cd52203fc280b1a67839d2">
+  <xsd:schema xmlns:xsd="http://www.w3.org/2001/XMLSchema" xmlns:xs="http://www.w3.org/2001/XMLSchema" xmlns:p="http://schemas.microsoft.com/office/2006/metadata/properties" xmlns:ns2="dab830d7-07ee-458a-b886-32578b44a612" xmlns:ns3="a048c95d-56bc-4d9d-b7f4-f756d5a4a43b" targetNamespace="http://schemas.microsoft.com/office/2006/metadata/properties" ma:root="true" ma:fieldsID="58676131b01e20bbc69541e42ec7772b" ns2:_="" ns3:_="">
     <xsd:import namespace="dab830d7-07ee-458a-b886-32578b44a612"/>
     <xsd:import namespace="a048c95d-56bc-4d9d-b7f4-f756d5a4a43b"/>
     <xsd:element name="properties">
@@ -5908,6 +5908,9 @@
                 <xsd:element ref="ns3:MediaServiceKeyPoints" minOccurs="0"/>
                 <xsd:element ref="ns3:MediaServiceLocation" minOccurs="0"/>
                 <xsd:element ref="ns3:MediaLengthInSeconds" minOccurs="0"/>
+                <xsd:element ref="ns3:lcf76f155ced4ddcb4097134ff3c332f" minOccurs="0"/>
+                <xsd:element ref="ns2:TaxCatchAll" minOccurs="0"/>
+                <xsd:element ref="ns3:MediaServiceObjectDetectorVersions" minOccurs="0"/>
               </xsd:all>
             </xsd:complexType>
           </xsd:element>
@@ -5943,6 +5946,17 @@
           <xsd:maxLength value="255"/>
         </xsd:restriction>
       </xsd:simpleType>
+    </xsd:element>
+    <xsd:element name="TaxCatchAll" ma:index="23" nillable="true" ma:displayName="Taxonomy Catch All Column" ma:hidden="true" ma:list="{35828c2f-142c-4d14-9ece-bbb868b00d38}" ma:internalName="TaxCatchAll" ma:showField="CatchAllData" ma:web="dab830d7-07ee-458a-b886-32578b44a612">
+      <xsd:complexType>
+        <xsd:complexContent>
+          <xsd:extension base="dms:MultiChoiceLookup">
+            <xsd:sequence>
+              <xsd:element name="Value" type="dms:Lookup" maxOccurs="unbounded" minOccurs="0" nillable="true"/>
+            </xsd:sequence>
+          </xsd:extension>
+        </xsd:complexContent>
+      </xsd:complexType>
     </xsd:element>
   </xsd:schema>
   <xsd:schema xmlns:xsd="http://www.w3.org/2001/XMLSchema" xmlns:xs="http://www.w3.org/2001/XMLSchema" xmlns:dms="http://schemas.microsoft.com/office/2006/documentManagement/types" xmlns:pc="http://schemas.microsoft.com/office/infopath/2007/PartnerControls" targetNamespace="a048c95d-56bc-4d9d-b7f4-f756d5a4a43b" elementFormDefault="qualified">
@@ -6005,6 +6019,18 @@
     <xsd:element name="MediaLengthInSeconds" ma:index="20" nillable="true" ma:displayName="Length (seconds)" ma:internalName="MediaLengthInSeconds" ma:readOnly="true">
       <xsd:simpleType>
         <xsd:restriction base="dms:Unknown"/>
+      </xsd:simpleType>
+    </xsd:element>
+    <xsd:element name="lcf76f155ced4ddcb4097134ff3c332f" ma:index="22" nillable="true" ma:taxonomy="true" ma:internalName="lcf76f155ced4ddcb4097134ff3c332f" ma:taxonomyFieldName="MediaServiceImageTags" ma:displayName="Image Tags" ma:readOnly="false" ma:fieldId="{5cf76f15-5ced-4ddc-b409-7134ff3c332f}" ma:taxonomyMulti="true" ma:sspId="fd1cee91-2f8e-42cc-b1e8-5796d73fb601" ma:termSetId="09814cd3-568e-fe90-9814-8d621ff8fb84" ma:anchorId="fba54fb3-c3e1-fe81-a776-ca4b69148c4d" ma:open="true" ma:isKeyword="false">
+      <xsd:complexType>
+        <xsd:sequence>
+          <xsd:element ref="pc:Terms" minOccurs="0" maxOccurs="1"/>
+        </xsd:sequence>
+      </xsd:complexType>
+    </xsd:element>
+    <xsd:element name="MediaServiceObjectDetectorVersions" ma:index="24" nillable="true" ma:displayName="MediaServiceObjectDetectorVersions" ma:description="" ma:hidden="true" ma:indexed="true" ma:internalName="MediaServiceObjectDetectorVersions" ma:readOnly="true">
+      <xsd:simpleType>
+        <xsd:restriction base="dms:Text"/>
       </xsd:simpleType>
     </xsd:element>
   </xsd:schema>
@@ -6118,12 +6144,17 @@
 
 <file path=customXml/item3.xml><?xml version="1.0" encoding="utf-8"?>
 <p:properties xmlns:p="http://schemas.microsoft.com/office/2006/metadata/properties" xmlns:xsi="http://www.w3.org/2001/XMLSchema-instance" xmlns:pc="http://schemas.microsoft.com/office/infopath/2007/PartnerControls">
-  <documentManagement/>
+  <documentManagement>
+    <lcf76f155ced4ddcb4097134ff3c332f xmlns="a048c95d-56bc-4d9d-b7f4-f756d5a4a43b">
+      <Terms xmlns="http://schemas.microsoft.com/office/infopath/2007/PartnerControls"/>
+    </lcf76f155ced4ddcb4097134ff3c332f>
+    <TaxCatchAll xmlns="dab830d7-07ee-458a-b886-32578b44a612" xsi:nil="true"/>
+  </documentManagement>
 </p:properties>
 </file>
 
 <file path=customXml/itemProps1.xml><?xml version="1.0" encoding="utf-8"?>
-<ds:datastoreItem xmlns:ds="http://schemas.openxmlformats.org/officeDocument/2006/customXml" ds:itemID="{E112A93E-BA04-4CCB-AE0B-99E04FD44202}"/>
+<ds:datastoreItem xmlns:ds="http://schemas.openxmlformats.org/officeDocument/2006/customXml" ds:itemID="{9704ABE5-0EE9-4A77-AA42-3F5662F2AF67}"/>
 </file>
 
 <file path=customXml/itemProps2.xml><?xml version="1.0" encoding="utf-8"?>

</xml_diff>